<commit_message>
Added First Progress Presentation
</commit_message>
<xml_diff>
--- a/Progress Presentation/Fraud_detection_dashboard_presentation_1.pptx
+++ b/Progress Presentation/Fraud_detection_dashboard_presentation_1.pptx
@@ -25,8 +25,9 @@
     <p:sldId id="279" r:id="rId19"/>
     <p:sldId id="276" r:id="rId20"/>
     <p:sldId id="282" r:id="rId21"/>
-    <p:sldId id="274" r:id="rId22"/>
-    <p:sldId id="275" r:id="rId23"/>
+    <p:sldId id="283" r:id="rId22"/>
+    <p:sldId id="274" r:id="rId23"/>
+    <p:sldId id="275" r:id="rId24"/>
   </p:sldIdLst>
   <p:sldSz cx="12192000" cy="6858000"/>
   <p:notesSz cx="6858000" cy="9144000"/>
@@ -3451,10 +3452,7 @@
           </a:p>
           <a:p>
             <a:pPr algn="r"/>
-            <a:r>
-              <a:rPr lang="en-IN" dirty="0"/>
-              <a:t>Presented by: Dr Mousumi Gupta</a:t>
-            </a:r>
+            <a:endParaRPr lang="en-IN" dirty="0"/>
           </a:p>
           <a:p>
             <a:pPr algn="r"/>
@@ -6454,6 +6452,89 @@
       </p:grpSpPr>
       <p:sp>
         <p:nvSpPr>
+          <p:cNvPr id="2" name="Title 1">
+            <a:extLst>
+              <a:ext uri="{FF2B5EF4-FFF2-40B4-BE49-F238E27FC236}">
+                <a16:creationId xmlns:a16="http://schemas.microsoft.com/office/drawing/2014/main" id="{8986E375-BFEC-D456-9AD4-261CCC99D0C2}"/>
+              </a:ext>
+            </a:extLst>
+          </p:cNvPr>
+          <p:cNvSpPr>
+            <a:spLocks noGrp="1"/>
+          </p:cNvSpPr>
+          <p:nvPr>
+            <p:ph type="title"/>
+          </p:nvPr>
+        </p:nvSpPr>
+        <p:spPr/>
+        <p:txBody>
+          <a:bodyPr/>
+          <a:lstStyle/>
+          <a:p>
+            <a:endParaRPr lang="en-IN"/>
+          </a:p>
+        </p:txBody>
+      </p:sp>
+      <p:sp>
+        <p:nvSpPr>
+          <p:cNvPr id="3" name="Content Placeholder 2">
+            <a:extLst>
+              <a:ext uri="{FF2B5EF4-FFF2-40B4-BE49-F238E27FC236}">
+                <a16:creationId xmlns:a16="http://schemas.microsoft.com/office/drawing/2014/main" id="{EACBC615-F10B-25AE-1EEA-76CA402C208C}"/>
+              </a:ext>
+            </a:extLst>
+          </p:cNvPr>
+          <p:cNvSpPr>
+            <a:spLocks noGrp="1"/>
+          </p:cNvSpPr>
+          <p:nvPr>
+            <p:ph idx="1"/>
+          </p:nvPr>
+        </p:nvSpPr>
+        <p:spPr/>
+        <p:txBody>
+          <a:bodyPr/>
+          <a:lstStyle/>
+          <a:p>
+            <a:r>
+              <a:rPr lang="en-IN" dirty="0"/>
+              <a:t>Future work (Yet to start the implementation)</a:t>
+            </a:r>
+          </a:p>
+        </p:txBody>
+      </p:sp>
+    </p:spTree>
+    <p:extLst>
+      <p:ext uri="{BB962C8B-B14F-4D97-AF65-F5344CB8AC3E}">
+        <p14:creationId xmlns:p14="http://schemas.microsoft.com/office/powerpoint/2010/main" val="2385812231"/>
+      </p:ext>
+    </p:extLst>
+  </p:cSld>
+  <p:clrMapOvr>
+    <a:masterClrMapping/>
+  </p:clrMapOvr>
+</p:sld>
+</file>
+
+<file path=ppt/slides/slide22.xml><?xml version="1.0" encoding="utf-8"?>
+<p:sld xmlns:a="http://schemas.openxmlformats.org/drawingml/2006/main" xmlns:r="http://schemas.openxmlformats.org/officeDocument/2006/relationships" xmlns:p="http://schemas.openxmlformats.org/presentationml/2006/main">
+  <p:cSld>
+    <p:spTree>
+      <p:nvGrpSpPr>
+        <p:cNvPr id="1" name=""/>
+        <p:cNvGrpSpPr/>
+        <p:nvPr/>
+      </p:nvGrpSpPr>
+      <p:grpSpPr>
+        <a:xfrm>
+          <a:off x="0" y="0"/>
+          <a:ext cx="0" cy="0"/>
+          <a:chOff x="0" y="0"/>
+          <a:chExt cx="0" cy="0"/>
+        </a:xfrm>
+      </p:grpSpPr>
+      <p:sp>
+        <p:nvSpPr>
           <p:cNvPr id="12" name="Rectangle 11">
             <a:extLst>
               <a:ext uri="{FF2B5EF4-FFF2-40B4-BE49-F238E27FC236}">
@@ -7003,7 +7084,7 @@
 </p:sld>
 </file>
 
-<file path=ppt/slides/slide22.xml><?xml version="1.0" encoding="utf-8"?>
+<file path=ppt/slides/slide23.xml><?xml version="1.0" encoding="utf-8"?>
 <p:sld xmlns:a="http://schemas.openxmlformats.org/drawingml/2006/main" xmlns:r="http://schemas.openxmlformats.org/officeDocument/2006/relationships" xmlns:p="http://schemas.openxmlformats.org/presentationml/2006/main">
   <p:cSld>
     <p:spTree>

</xml_diff>